<commit_message>
Correctif empêchant le bon fonctionnement du prog
</commit_message>
<xml_diff>
--- a/Documents/Présentation - OC - Projet n°5.pptx
+++ b/Documents/Présentation - OC - Projet n°5.pptx
@@ -3562,7 +3562,7 @@
         <p:spPr>
           <a:xfrm>
             <a:off x="251670" y="1997839"/>
-            <a:ext cx="10821798" cy="2862322"/>
+            <a:ext cx="10821798" cy="1200329"/>
           </a:xfrm>
           <a:prstGeom prst="rect">
             <a:avLst/>
@@ -3576,18 +3576,34 @@
           <a:lstStyle/>
           <a:p>
             <a:r>
+              <a:rPr lang="fr-FR" dirty="0" smtClean="0"/>
+              <a:t>Pour ce projet 5, j’ai essayé de débuter de mettre en place les différentes remarques qui m’ont été faites </a:t>
+            </a:r>
+            <a:r>
+              <a:rPr lang="fr-FR" dirty="0" smtClean="0"/>
+              <a:t>lors du projet 3. </a:t>
+            </a:r>
+            <a:r>
+              <a:rPr lang="fr-FR" dirty="0" smtClean="0"/>
+              <a:t>La logique était de se tourner tout de suite vers </a:t>
+            </a:r>
+            <a:r>
               <a:rPr lang="fr-FR" dirty="0"/>
-              <a:t>Lors de la mise en place du projet, la logique utilisée fut celle apprise en autodidacte lors de mes quelques années en tant que développeur pour mon employeur. Cela m’a confronté aux limites de mon apprentissage en autodidacte. </a:t>
-            </a:r>
-          </a:p>
-          <a:p>
+              <a:t>u</a:t>
+            </a:r>
+            <a:r>
+              <a:rPr lang="fr-FR" dirty="0" smtClean="0"/>
+              <a:t>ne programmation résolument orienté objet, scinder le projet en grand thème et faire </a:t>
+            </a:r>
+            <a:r>
+              <a:rPr lang="fr-FR" dirty="0" err="1" smtClean="0"/>
+              <a:t>émmerger</a:t>
+            </a:r>
+            <a:r>
+              <a:rPr lang="fr-FR" smtClean="0"/>
+              <a:t>  </a:t>
+            </a:r>
             <a:endParaRPr lang="fr-FR" dirty="0"/>
-          </a:p>
-          <a:p>
-            <a:r>
-              <a:rPr lang="fr-FR" dirty="0"/>
-              <a:t>Une mauvaise utilisation des modules et des classes entraînent des répercussions que je n’avais pas mis en évidence, devant bien souvent résoudre un souci identifié sans devoir concevoir d’évolution sur le temps. Cette utilisation rudimentaire de python me faisait passer à coté d’une grande simplification de la conception d’un programme et surtout l’apprentissage d’une programmation orientée objet qui me permet de prendre en compte l’évolution de l’amélioration continue d’un programme.</a:t>
-            </a:r>
           </a:p>
           <a:p>
             <a:r>
@@ -6825,7 +6841,7 @@
         <p:spPr>
           <a:xfrm>
             <a:off x="341832" y="1505396"/>
-            <a:ext cx="4999290" cy="646331"/>
+            <a:ext cx="4999290" cy="2862322"/>
           </a:xfrm>
           <a:prstGeom prst="rect">
             <a:avLst/>
@@ -6852,6 +6868,21 @@
             </a:r>
           </a:p>
           <a:p>
+            <a:endParaRPr lang="fr-FR" dirty="0" smtClean="0"/>
+          </a:p>
+          <a:p>
+            <a:r>
+              <a:rPr lang="fr-FR" dirty="0" smtClean="0"/>
+              <a:t>Le constructeur est appelé pour créer l’objet connexion, lors de son initialisation la connexion avec la base de donnée est vérifié puis les informations de connexion sont listé. A chaque fois qu’une requête SQL doit être utilisé l’objet est interpellé. Une fonction permet d’interpellé le script </a:t>
+            </a:r>
+            <a:r>
+              <a:rPr lang="fr-FR" dirty="0" err="1" smtClean="0"/>
+              <a:t>sql</a:t>
+            </a:r>
+            <a:r>
+              <a:rPr lang="fr-FR" dirty="0" smtClean="0"/>
+              <a:t> pour générer l’architecture de la base de donnée.</a:t>
+            </a:r>
             <a:endParaRPr lang="fr-FR" dirty="0" smtClean="0"/>
           </a:p>
         </p:txBody>
@@ -6911,7 +6942,7 @@
         <p:spPr>
           <a:xfrm>
             <a:off x="5939327" y="1505396"/>
-            <a:ext cx="5212936" cy="646331"/>
+            <a:ext cx="5212936" cy="2308324"/>
           </a:xfrm>
           <a:prstGeom prst="rect">
             <a:avLst/>
@@ -6946,6 +6977,19 @@
             </a:r>
           </a:p>
           <a:p>
+            <a:endParaRPr lang="fr-FR" dirty="0" smtClean="0"/>
+          </a:p>
+          <a:p>
+            <a:r>
+              <a:rPr lang="fr-FR" dirty="0" smtClean="0"/>
+              <a:t>Ce fichier contient la class main, lancé pour exécuter les différents modules du programme.</a:t>
+            </a:r>
+          </a:p>
+          <a:p>
+            <a:r>
+              <a:rPr lang="fr-FR" dirty="0" smtClean="0"/>
+              <a:t>Une boucle relance l’information de départ tant que l’utilisateur n’a pas sélectionné « quitter ». Le programme se clos quand un soucis est remonté et se termine en montrant l’erreur.</a:t>
+            </a:r>
             <a:endParaRPr lang="fr-FR" dirty="0" smtClean="0"/>
           </a:p>
         </p:txBody>
@@ -7151,16 +7195,21 @@
           <a:p>
             <a:r>
               <a:rPr lang="fr-FR" dirty="0"/>
-              <a:t>	Création d’une procédure d’installation de python 3, de </a:t>
-            </a:r>
-            <a:r>
-              <a:rPr lang="fr-FR" dirty="0" err="1"/>
-              <a:t>pygame</a:t>
-            </a:r>
-            <a:r>
-              <a:rPr lang="fr-FR" dirty="0"/>
-              <a:t> et de Git. </a:t>
-            </a:r>
+              <a:t>	Création d’une procédure d’installation de python 3, </a:t>
+            </a:r>
+            <a:r>
+              <a:rPr lang="fr-FR" dirty="0" smtClean="0"/>
+              <a:t>de Git, de </a:t>
+            </a:r>
+            <a:r>
+              <a:rPr lang="fr-FR" dirty="0" err="1" smtClean="0"/>
+              <a:t>Mysql</a:t>
+            </a:r>
+            <a:r>
+              <a:rPr lang="fr-FR" dirty="0" smtClean="0"/>
+              <a:t> </a:t>
+            </a:r>
+            <a:endParaRPr lang="fr-FR" dirty="0"/>
           </a:p>
           <a:p>
             <a:r>

</xml_diff>